<commit_message>
finish all of the tasks about my thesis:)
</commit_message>
<xml_diff>
--- a/otmm_decimal/result_colab/result_existing_1000_1.0_15_40_ColabPP/result_existing_1000_1.0_15_40_parsing.pptx
+++ b/otmm_decimal/result_colab/result_existing_1000_1.0_15_40_ColabPP/result_existing_1000_1.0_15_40_parsing.pptx
@@ -263,7 +263,7 @@
           <a:p>
             <a:fld id="{A1CCF42C-534B-4F17-84EB-3026585EF5A2}" type="datetimeFigureOut">
               <a:rPr kumimoji="1" lang="ja-JP" altLang="en-US" smtClean="0"/>
-              <a:t>2023/1/3</a:t>
+              <a:t>2023/1/22</a:t>
             </a:fld>
             <a:endParaRPr kumimoji="1" lang="ja-JP" altLang="en-US"/>
           </a:p>
@@ -493,7 +493,7 @@
           <a:p>
             <a:fld id="{A1CCF42C-534B-4F17-84EB-3026585EF5A2}" type="datetimeFigureOut">
               <a:rPr kumimoji="1" lang="ja-JP" altLang="en-US" smtClean="0"/>
-              <a:t>2023/1/3</a:t>
+              <a:t>2023/1/22</a:t>
             </a:fld>
             <a:endParaRPr kumimoji="1" lang="ja-JP" altLang="en-US"/>
           </a:p>
@@ -733,7 +733,7 @@
           <a:p>
             <a:fld id="{A1CCF42C-534B-4F17-84EB-3026585EF5A2}" type="datetimeFigureOut">
               <a:rPr kumimoji="1" lang="ja-JP" altLang="en-US" smtClean="0"/>
-              <a:t>2023/1/3</a:t>
+              <a:t>2023/1/22</a:t>
             </a:fld>
             <a:endParaRPr kumimoji="1" lang="ja-JP" altLang="en-US"/>
           </a:p>
@@ -963,7 +963,7 @@
           <a:p>
             <a:fld id="{A1CCF42C-534B-4F17-84EB-3026585EF5A2}" type="datetimeFigureOut">
               <a:rPr kumimoji="1" lang="ja-JP" altLang="en-US" smtClean="0"/>
-              <a:t>2023/1/3</a:t>
+              <a:t>2023/1/22</a:t>
             </a:fld>
             <a:endParaRPr kumimoji="1" lang="ja-JP" altLang="en-US"/>
           </a:p>
@@ -1238,7 +1238,7 @@
           <a:p>
             <a:fld id="{A1CCF42C-534B-4F17-84EB-3026585EF5A2}" type="datetimeFigureOut">
               <a:rPr kumimoji="1" lang="ja-JP" altLang="en-US" smtClean="0"/>
-              <a:t>2023/1/3</a:t>
+              <a:t>2023/1/22</a:t>
             </a:fld>
             <a:endParaRPr kumimoji="1" lang="ja-JP" altLang="en-US"/>
           </a:p>
@@ -1567,7 +1567,7 @@
           <a:p>
             <a:fld id="{A1CCF42C-534B-4F17-84EB-3026585EF5A2}" type="datetimeFigureOut">
               <a:rPr kumimoji="1" lang="ja-JP" altLang="en-US" smtClean="0"/>
-              <a:t>2023/1/3</a:t>
+              <a:t>2023/1/22</a:t>
             </a:fld>
             <a:endParaRPr kumimoji="1" lang="ja-JP" altLang="en-US"/>
           </a:p>
@@ -2043,7 +2043,7 @@
           <a:p>
             <a:fld id="{A1CCF42C-534B-4F17-84EB-3026585EF5A2}" type="datetimeFigureOut">
               <a:rPr kumimoji="1" lang="ja-JP" altLang="en-US" smtClean="0"/>
-              <a:t>2023/1/3</a:t>
+              <a:t>2023/1/22</a:t>
             </a:fld>
             <a:endParaRPr kumimoji="1" lang="ja-JP" altLang="en-US"/>
           </a:p>
@@ -2184,7 +2184,7 @@
           <a:p>
             <a:fld id="{A1CCF42C-534B-4F17-84EB-3026585EF5A2}" type="datetimeFigureOut">
               <a:rPr kumimoji="1" lang="ja-JP" altLang="en-US" smtClean="0"/>
-              <a:t>2023/1/3</a:t>
+              <a:t>2023/1/22</a:t>
             </a:fld>
             <a:endParaRPr kumimoji="1" lang="ja-JP" altLang="en-US"/>
           </a:p>
@@ -2297,7 +2297,7 @@
           <a:p>
             <a:fld id="{A1CCF42C-534B-4F17-84EB-3026585EF5A2}" type="datetimeFigureOut">
               <a:rPr kumimoji="1" lang="ja-JP" altLang="en-US" smtClean="0"/>
-              <a:t>2023/1/3</a:t>
+              <a:t>2023/1/22</a:t>
             </a:fld>
             <a:endParaRPr kumimoji="1" lang="ja-JP" altLang="en-US"/>
           </a:p>
@@ -2640,7 +2640,7 @@
           <a:p>
             <a:fld id="{A1CCF42C-534B-4F17-84EB-3026585EF5A2}" type="datetimeFigureOut">
               <a:rPr kumimoji="1" lang="ja-JP" altLang="en-US" smtClean="0"/>
-              <a:t>2023/1/3</a:t>
+              <a:t>2023/1/22</a:t>
             </a:fld>
             <a:endParaRPr kumimoji="1" lang="ja-JP" altLang="en-US"/>
           </a:p>
@@ -2928,7 +2928,7 @@
           <a:p>
             <a:fld id="{A1CCF42C-534B-4F17-84EB-3026585EF5A2}" type="datetimeFigureOut">
               <a:rPr kumimoji="1" lang="ja-JP" altLang="en-US" smtClean="0"/>
-              <a:t>2023/1/3</a:t>
+              <a:t>2023/1/22</a:t>
             </a:fld>
             <a:endParaRPr kumimoji="1" lang="ja-JP" altLang="en-US"/>
           </a:p>
@@ -3201,7 +3201,7 @@
           <a:p>
             <a:fld id="{A1CCF42C-534B-4F17-84EB-3026585EF5A2}" type="datetimeFigureOut">
               <a:rPr kumimoji="1" lang="ja-JP" altLang="en-US" smtClean="0"/>
-              <a:t>2023/1/3</a:t>
+              <a:t>2023/1/22</a:t>
             </a:fld>
             <a:endParaRPr kumimoji="1" lang="ja-JP" altLang="en-US"/>
           </a:p>
@@ -14599,6 +14599,165 @@
           </a:p>
         </p:txBody>
       </p:sp>
+      <p:sp>
+        <p:nvSpPr>
+          <p:cNvPr id="2" name="テキスト ボックス 1">
+            <a:extLst>
+              <a:ext uri="{FF2B5EF4-FFF2-40B4-BE49-F238E27FC236}">
+                <a16:creationId xmlns:a16="http://schemas.microsoft.com/office/drawing/2014/main" id="{A45CC8A0-22B1-325F-1D72-4A58B672A4DB}"/>
+              </a:ext>
+            </a:extLst>
+          </p:cNvPr>
+          <p:cNvSpPr txBox="1"/>
+          <p:nvPr/>
+        </p:nvSpPr>
+        <p:spPr>
+          <a:xfrm>
+            <a:off x="10410384" y="5314177"/>
+            <a:ext cx="1102310" cy="369332"/>
+          </a:xfrm>
+          <a:prstGeom prst="rect">
+            <a:avLst/>
+          </a:prstGeom>
+          <a:noFill/>
+        </p:spPr>
+        <p:txBody>
+          <a:bodyPr wrap="square" rtlCol="0">
+            <a:spAutoFit/>
+          </a:bodyPr>
+          <a:lstStyle/>
+          <a:p>
+            <a:r>
+              <a:rPr lang="ja-JP" altLang="en-US" dirty="0"/>
+              <a:t>親子関係</a:t>
+            </a:r>
+            <a:endParaRPr kumimoji="1" lang="ja-JP" altLang="en-US" dirty="0"/>
+          </a:p>
+        </p:txBody>
+      </p:sp>
+      <p:cxnSp>
+        <p:nvCxnSpPr>
+          <p:cNvPr id="3" name="直線矢印コネクタ 2">
+            <a:extLst>
+              <a:ext uri="{FF2B5EF4-FFF2-40B4-BE49-F238E27FC236}">
+                <a16:creationId xmlns:a16="http://schemas.microsoft.com/office/drawing/2014/main" id="{30D51198-580C-F664-0979-CBCC6E081115}"/>
+              </a:ext>
+            </a:extLst>
+          </p:cNvPr>
+          <p:cNvCxnSpPr>
+            <a:cxnSpLocks/>
+          </p:cNvCxnSpPr>
+          <p:nvPr/>
+        </p:nvCxnSpPr>
+        <p:spPr>
+          <a:xfrm flipV="1">
+            <a:off x="9663412" y="5501231"/>
+            <a:ext cx="746972" cy="6350"/>
+          </a:xfrm>
+          <a:prstGeom prst="straightConnector1">
+            <a:avLst/>
+          </a:prstGeom>
+          <a:ln w="12700">
+            <a:tailEnd type="triangle"/>
+          </a:ln>
+        </p:spPr>
+        <p:style>
+          <a:lnRef idx="1">
+            <a:schemeClr val="accent1"/>
+          </a:lnRef>
+          <a:fillRef idx="0">
+            <a:schemeClr val="accent1"/>
+          </a:fillRef>
+          <a:effectRef idx="0">
+            <a:schemeClr val="accent1"/>
+          </a:effectRef>
+          <a:fontRef idx="minor">
+            <a:schemeClr val="tx1"/>
+          </a:fontRef>
+        </p:style>
+      </p:cxnSp>
+      <p:sp>
+        <p:nvSpPr>
+          <p:cNvPr id="4" name="テキスト ボックス 3">
+            <a:extLst>
+              <a:ext uri="{FF2B5EF4-FFF2-40B4-BE49-F238E27FC236}">
+                <a16:creationId xmlns:a16="http://schemas.microsoft.com/office/drawing/2014/main" id="{750B3702-EB6A-D1B2-3F6B-1FF83540041C}"/>
+              </a:ext>
+            </a:extLst>
+          </p:cNvPr>
+          <p:cNvSpPr txBox="1"/>
+          <p:nvPr/>
+        </p:nvSpPr>
+        <p:spPr>
+          <a:xfrm>
+            <a:off x="10410384" y="5694635"/>
+            <a:ext cx="1102310" cy="369332"/>
+          </a:xfrm>
+          <a:prstGeom prst="rect">
+            <a:avLst/>
+          </a:prstGeom>
+          <a:noFill/>
+        </p:spPr>
+        <p:txBody>
+          <a:bodyPr wrap="square" rtlCol="0">
+            <a:spAutoFit/>
+          </a:bodyPr>
+          <a:lstStyle/>
+          <a:p>
+            <a:r>
+              <a:rPr lang="ja-JP" altLang="en-US" dirty="0"/>
+              <a:t>兄弟関係</a:t>
+            </a:r>
+            <a:endParaRPr kumimoji="1" lang="ja-JP" altLang="en-US" dirty="0"/>
+          </a:p>
+        </p:txBody>
+      </p:sp>
+      <p:cxnSp>
+        <p:nvCxnSpPr>
+          <p:cNvPr id="5" name="直線矢印コネクタ 4">
+            <a:extLst>
+              <a:ext uri="{FF2B5EF4-FFF2-40B4-BE49-F238E27FC236}">
+                <a16:creationId xmlns:a16="http://schemas.microsoft.com/office/drawing/2014/main" id="{D95C612E-CA68-754B-3B60-6D8441BD7275}"/>
+              </a:ext>
+            </a:extLst>
+          </p:cNvPr>
+          <p:cNvCxnSpPr>
+            <a:cxnSpLocks/>
+            <a:endCxn id="4" idx="1"/>
+          </p:cNvCxnSpPr>
+          <p:nvPr/>
+        </p:nvCxnSpPr>
+        <p:spPr>
+          <a:xfrm>
+            <a:off x="9663412" y="5879301"/>
+            <a:ext cx="746972" cy="0"/>
+          </a:xfrm>
+          <a:prstGeom prst="straightConnector1">
+            <a:avLst/>
+          </a:prstGeom>
+          <a:ln w="12700">
+            <a:solidFill>
+              <a:schemeClr val="accent2"/>
+            </a:solidFill>
+            <a:prstDash val="sysDash"/>
+            <a:tailEnd type="triangle"/>
+          </a:ln>
+        </p:spPr>
+        <p:style>
+          <a:lnRef idx="1">
+            <a:schemeClr val="accent1"/>
+          </a:lnRef>
+          <a:fillRef idx="0">
+            <a:schemeClr val="accent1"/>
+          </a:fillRef>
+          <a:effectRef idx="0">
+            <a:schemeClr val="accent1"/>
+          </a:effectRef>
+          <a:fontRef idx="minor">
+            <a:schemeClr val="tx1"/>
+          </a:fontRef>
+        </p:style>
+      </p:cxnSp>
     </p:spTree>
     <p:extLst>
       <p:ext uri="{BB962C8B-B14F-4D97-AF65-F5344CB8AC3E}">

</xml_diff>